<commit_message>
fixed aic and bic
</commit_message>
<xml_diff>
--- a/UVB-exposure-on-melanoma-mortality.pptx
+++ b/UVB-exposure-on-melanoma-mortality.pptx
@@ -220,7 +220,7 @@
           <a:p>
             <a:fld id="{64772BF1-E5F6-7A49-B9EA-C03B53BF8D93}" type="datetimeFigureOut">
               <a:rPr lang="it-IT" smtClean="0"/>
-              <a:t>19/06/24</a:t>
+              <a:t>30/06/24</a:t>
             </a:fld>
             <a:endParaRPr lang="it-IT"/>
           </a:p>
@@ -1182,6 +1182,14 @@
             </a:r>
             <a:r>
               <a:rPr lang="it-IT" dirty="0"/>
+              <a:t> </a:t>
+            </a:r>
+            <a:r>
+              <a:rPr lang="it-IT" dirty="0" err="1"/>
+              <a:t>almost</a:t>
+            </a:r>
+            <a:r>
+              <a:rPr lang="it-IT" dirty="0"/>
               <a:t> the </a:t>
             </a:r>
             <a:r>
@@ -1199,6 +1207,15 @@
             <a:r>
               <a:rPr lang="it-IT" dirty="0"/>
               <a:t> the one for model M1</a:t>
+            </a:r>
+          </a:p>
+          <a:p>
+            <a:endParaRPr lang="it-IT" dirty="0"/>
+          </a:p>
+          <a:p>
+            <a:r>
+              <a:rPr lang="it-IT" dirty="0"/>
+              <a:t>SISTEMA E CONTROLLA</a:t>
             </a:r>
           </a:p>
         </p:txBody>
@@ -3483,7 +3500,7 @@
           <a:p>
             <a:fld id="{4EA50560-6CC8-914C-9AB5-2FD017C5E165}" type="datetimeFigureOut">
               <a:rPr lang="it-IT" smtClean="0"/>
-              <a:t>19/06/24</a:t>
+              <a:t>30/06/24</a:t>
             </a:fld>
             <a:endParaRPr lang="it-IT"/>
           </a:p>
@@ -3681,7 +3698,7 @@
           <a:p>
             <a:fld id="{4EA50560-6CC8-914C-9AB5-2FD017C5E165}" type="datetimeFigureOut">
               <a:rPr lang="it-IT" smtClean="0"/>
-              <a:t>19/06/24</a:t>
+              <a:t>30/06/24</a:t>
             </a:fld>
             <a:endParaRPr lang="it-IT"/>
           </a:p>
@@ -3889,7 +3906,7 @@
           <a:p>
             <a:fld id="{4EA50560-6CC8-914C-9AB5-2FD017C5E165}" type="datetimeFigureOut">
               <a:rPr lang="it-IT" smtClean="0"/>
-              <a:t>19/06/24</a:t>
+              <a:t>30/06/24</a:t>
             </a:fld>
             <a:endParaRPr lang="it-IT"/>
           </a:p>
@@ -4087,7 +4104,7 @@
           <a:p>
             <a:fld id="{4EA50560-6CC8-914C-9AB5-2FD017C5E165}" type="datetimeFigureOut">
               <a:rPr lang="it-IT" smtClean="0"/>
-              <a:t>19/06/24</a:t>
+              <a:t>30/06/24</a:t>
             </a:fld>
             <a:endParaRPr lang="it-IT"/>
           </a:p>
@@ -4362,7 +4379,7 @@
           <a:p>
             <a:fld id="{4EA50560-6CC8-914C-9AB5-2FD017C5E165}" type="datetimeFigureOut">
               <a:rPr lang="it-IT" smtClean="0"/>
-              <a:t>19/06/24</a:t>
+              <a:t>30/06/24</a:t>
             </a:fld>
             <a:endParaRPr lang="it-IT"/>
           </a:p>
@@ -4627,7 +4644,7 @@
           <a:p>
             <a:fld id="{4EA50560-6CC8-914C-9AB5-2FD017C5E165}" type="datetimeFigureOut">
               <a:rPr lang="it-IT" smtClean="0"/>
-              <a:t>19/06/24</a:t>
+              <a:t>30/06/24</a:t>
             </a:fld>
             <a:endParaRPr lang="it-IT"/>
           </a:p>
@@ -5039,7 +5056,7 @@
           <a:p>
             <a:fld id="{4EA50560-6CC8-914C-9AB5-2FD017C5E165}" type="datetimeFigureOut">
               <a:rPr lang="it-IT" smtClean="0"/>
-              <a:t>19/06/24</a:t>
+              <a:t>30/06/24</a:t>
             </a:fld>
             <a:endParaRPr lang="it-IT"/>
           </a:p>
@@ -5180,7 +5197,7 @@
           <a:p>
             <a:fld id="{4EA50560-6CC8-914C-9AB5-2FD017C5E165}" type="datetimeFigureOut">
               <a:rPr lang="it-IT" smtClean="0"/>
-              <a:t>19/06/24</a:t>
+              <a:t>30/06/24</a:t>
             </a:fld>
             <a:endParaRPr lang="it-IT"/>
           </a:p>
@@ -5293,7 +5310,7 @@
           <a:p>
             <a:fld id="{4EA50560-6CC8-914C-9AB5-2FD017C5E165}" type="datetimeFigureOut">
               <a:rPr lang="it-IT" smtClean="0"/>
-              <a:t>19/06/24</a:t>
+              <a:t>30/06/24</a:t>
             </a:fld>
             <a:endParaRPr lang="it-IT"/>
           </a:p>
@@ -5604,7 +5621,7 @@
           <a:p>
             <a:fld id="{4EA50560-6CC8-914C-9AB5-2FD017C5E165}" type="datetimeFigureOut">
               <a:rPr lang="it-IT" smtClean="0"/>
-              <a:t>19/06/24</a:t>
+              <a:t>30/06/24</a:t>
             </a:fld>
             <a:endParaRPr lang="it-IT"/>
           </a:p>
@@ -5892,7 +5909,7 @@
           <a:p>
             <a:fld id="{4EA50560-6CC8-914C-9AB5-2FD017C5E165}" type="datetimeFigureOut">
               <a:rPr lang="it-IT" smtClean="0"/>
-              <a:t>19/06/24</a:t>
+              <a:t>30/06/24</a:t>
             </a:fld>
             <a:endParaRPr lang="it-IT"/>
           </a:p>
@@ -6133,7 +6150,7 @@
           <a:p>
             <a:fld id="{4EA50560-6CC8-914C-9AB5-2FD017C5E165}" type="datetimeFigureOut">
               <a:rPr lang="it-IT" smtClean="0"/>
-              <a:t>19/06/24</a:t>
+              <a:t>30/06/24</a:t>
             </a:fld>
             <a:endParaRPr lang="it-IT"/>
           </a:p>
@@ -8155,11 +8172,66 @@
             </a:r>
             <a:r>
               <a:rPr lang="it-IT" sz="2500" dirty="0">
+                <a:latin typeface="Andale Mono" panose="020B0509000000000004" pitchFamily="49" charset="0"/>
+                <a:cs typeface="Arial" panose="020B0604020202020204" pitchFamily="34" charset="0"/>
+              </a:rPr>
+              <a:t>)</a:t>
+            </a:r>
+            <a:r>
+              <a:rPr lang="it-IT" sz="2500" dirty="0">
                 <a:effectLst/>
                 <a:latin typeface="Andale Mono" panose="020B0509000000000004" pitchFamily="49" charset="0"/>
                 <a:cs typeface="Arial" panose="020B0604020202020204" pitchFamily="34" charset="0"/>
               </a:rPr>
-              <a:t>), </a:t>
+              <a:t> +</a:t>
+            </a:r>
+          </a:p>
+          <a:p>
+            <a:pPr marL="0" indent="0">
+              <a:buNone/>
+            </a:pPr>
+            <a:r>
+              <a:rPr lang="it-IT" sz="2500" dirty="0">
+                <a:latin typeface="Andale Mono" panose="020B0509000000000004" pitchFamily="49" charset="0"/>
+                <a:cs typeface="Arial" panose="020B0604020202020204" pitchFamily="34" charset="0"/>
+              </a:rPr>
+              <a:t>					+ </a:t>
+            </a:r>
+            <a:r>
+              <a:rPr lang="it-IT" sz="2500" dirty="0">
+                <a:effectLst/>
+                <a:latin typeface="Andale Mono" panose="020B0509000000000004" pitchFamily="49" charset="0"/>
+                <a:cs typeface="Arial" panose="020B0604020202020204" pitchFamily="34" charset="0"/>
+              </a:rPr>
+              <a:t>(1 | </a:t>
+            </a:r>
+            <a:r>
+              <a:rPr lang="it-IT" sz="2500" dirty="0" err="1">
+                <a:effectLst/>
+                <a:latin typeface="Andale Mono" panose="020B0509000000000004" pitchFamily="49" charset="0"/>
+                <a:cs typeface="Arial" panose="020B0604020202020204" pitchFamily="34" charset="0"/>
+              </a:rPr>
+              <a:t>nation</a:t>
+            </a:r>
+            <a:r>
+              <a:rPr lang="it-IT" sz="2500" dirty="0">
+                <a:effectLst/>
+                <a:latin typeface="Andale Mono" panose="020B0509000000000004" pitchFamily="49" charset="0"/>
+                <a:cs typeface="Arial" panose="020B0604020202020204" pitchFamily="34" charset="0"/>
+              </a:rPr>
+              <a:t>),</a:t>
+            </a:r>
+          </a:p>
+          <a:p>
+            <a:pPr marL="0" indent="0">
+              <a:buNone/>
+            </a:pPr>
+            <a:r>
+              <a:rPr lang="it-IT" sz="2500" dirty="0">
+                <a:latin typeface="Andale Mono" panose="020B0509000000000004" pitchFamily="49" charset="0"/>
+                <a:cs typeface="Arial" panose="020B0604020202020204" pitchFamily="34" charset="0"/>
+              </a:rPr>
+              <a:t>			</a:t>
             </a:r>
             <a:r>
               <a:rPr lang="it-IT" sz="2500" dirty="0" err="1">
@@ -9581,7 +9653,35 @@
                 <a:latin typeface="Andale Mono" panose="020B0509000000000004" pitchFamily="49" charset="0"/>
                 <a:cs typeface="Arial" panose="020B0604020202020204" pitchFamily="34" charset="0"/>
               </a:rPr>
-              <a:t>), </a:t>
+              <a:t>) + (1 | </a:t>
+            </a:r>
+            <a:r>
+              <a:rPr lang="it-IT" sz="2500" dirty="0" err="1">
+                <a:effectLst/>
+                <a:latin typeface="Andale Mono" panose="020B0509000000000004" pitchFamily="49" charset="0"/>
+                <a:cs typeface="Arial" panose="020B0604020202020204" pitchFamily="34" charset="0"/>
+              </a:rPr>
+              <a:t>nation</a:t>
+            </a:r>
+            <a:r>
+              <a:rPr lang="it-IT" sz="2500" dirty="0">
+                <a:effectLst/>
+                <a:latin typeface="Andale Mono" panose="020B0509000000000004" pitchFamily="49" charset="0"/>
+                <a:cs typeface="Arial" panose="020B0604020202020204" pitchFamily="34" charset="0"/>
+              </a:rPr>
+              <a:t>),</a:t>
+            </a:r>
+          </a:p>
+          <a:p>
+            <a:pPr marL="0" indent="0">
+              <a:buNone/>
+            </a:pPr>
+            <a:r>
+              <a:rPr lang="it-IT" sz="2500" dirty="0">
+                <a:latin typeface="Andale Mono" panose="020B0509000000000004" pitchFamily="49" charset="0"/>
+                <a:cs typeface="Arial" panose="020B0604020202020204" pitchFamily="34" charset="0"/>
+              </a:rPr>
+              <a:t>				</a:t>
             </a:r>
             <a:r>
               <a:rPr lang="it-IT" sz="2500" dirty="0" err="1">
@@ -10164,95 +10264,6 @@
           <a:xfrm>
             <a:off x="179714" y="2903126"/>
             <a:ext cx="5626615" cy="1088019"/>
-          </a:xfrm>
-          <a:prstGeom prst="rect">
-            <a:avLst/>
-          </a:prstGeom>
-        </p:spPr>
-      </p:pic>
-      <p:pic>
-        <p:nvPicPr>
-          <p:cNvPr id="12" name="Immagine 11" descr="Immagine che contiene testo, Carattere, schermata, bianco&#10;&#10;Descrizione generata automaticamente">
-            <a:extLst>
-              <a:ext uri="{FF2B5EF4-FFF2-40B4-BE49-F238E27FC236}">
-                <a16:creationId xmlns:a16="http://schemas.microsoft.com/office/drawing/2014/main" id="{B96086C2-0CAF-9EE7-D1E0-DE723D62EE85}"/>
-              </a:ext>
-            </a:extLst>
-          </p:cNvPr>
-          <p:cNvPicPr>
-            <a:picLocks noChangeAspect="1"/>
-          </p:cNvPicPr>
-          <p:nvPr/>
-        </p:nvPicPr>
-        <p:blipFill>
-          <a:blip r:embed="rId5"/>
-          <a:stretch>
-            <a:fillRect/>
-          </a:stretch>
-        </p:blipFill>
-        <p:spPr>
-          <a:xfrm>
-            <a:off x="179714" y="4413052"/>
-            <a:ext cx="6961146" cy="1315042"/>
-          </a:xfrm>
-          <a:prstGeom prst="rect">
-            <a:avLst/>
-          </a:prstGeom>
-        </p:spPr>
-      </p:pic>
-      <p:pic>
-        <p:nvPicPr>
-          <p:cNvPr id="14" name="Immagine 13">
-            <a:extLst>
-              <a:ext uri="{FF2B5EF4-FFF2-40B4-BE49-F238E27FC236}">
-                <a16:creationId xmlns:a16="http://schemas.microsoft.com/office/drawing/2014/main" id="{FF6C32FF-6807-0CFE-FF60-7FD02EDDE6E1}"/>
-              </a:ext>
-            </a:extLst>
-          </p:cNvPr>
-          <p:cNvPicPr>
-            <a:picLocks noChangeAspect="1"/>
-          </p:cNvPicPr>
-          <p:nvPr/>
-        </p:nvPicPr>
-        <p:blipFill>
-          <a:blip r:embed="rId6"/>
-          <a:stretch>
-            <a:fillRect/>
-          </a:stretch>
-        </p:blipFill>
-        <p:spPr>
-          <a:xfrm>
-            <a:off x="200992" y="5728094"/>
-            <a:ext cx="6871854" cy="670077"/>
-          </a:xfrm>
-          <a:prstGeom prst="rect">
-            <a:avLst/>
-          </a:prstGeom>
-        </p:spPr>
-      </p:pic>
-      <p:pic>
-        <p:nvPicPr>
-          <p:cNvPr id="15" name="Immagine 14" descr="Immagine che contiene testo, Carattere, bianco, schermata&#10;&#10;Descrizione generata automaticamente">
-            <a:extLst>
-              <a:ext uri="{FF2B5EF4-FFF2-40B4-BE49-F238E27FC236}">
-                <a16:creationId xmlns:a16="http://schemas.microsoft.com/office/drawing/2014/main" id="{45AE992F-3E74-2560-96A5-2DCCBE1A5069}"/>
-              </a:ext>
-            </a:extLst>
-          </p:cNvPr>
-          <p:cNvPicPr>
-            <a:picLocks noChangeAspect="1"/>
-          </p:cNvPicPr>
-          <p:nvPr/>
-        </p:nvPicPr>
-        <p:blipFill rotWithShape="1">
-          <a:blip r:embed="rId3"/>
-          <a:srcRect l="62536"/>
-          <a:stretch/>
-        </p:blipFill>
-        <p:spPr>
-          <a:xfrm>
-            <a:off x="2455920" y="1026063"/>
-            <a:ext cx="2965607" cy="1337227"/>
           </a:xfrm>
           <a:prstGeom prst="rect">
             <a:avLst/>
@@ -10820,6 +10831,95 @@
           </a:p>
         </p:txBody>
       </p:sp>
+      <p:pic>
+        <p:nvPicPr>
+          <p:cNvPr id="5" name="Immagine 4" descr="Immagine che contiene testo, Carattere, bianco, schermata&#10;&#10;Descrizione generata automaticamente">
+            <a:extLst>
+              <a:ext uri="{FF2B5EF4-FFF2-40B4-BE49-F238E27FC236}">
+                <a16:creationId xmlns:a16="http://schemas.microsoft.com/office/drawing/2014/main" id="{23E34B91-2AEE-09BD-FEFE-844851D0E28F}"/>
+              </a:ext>
+            </a:extLst>
+          </p:cNvPr>
+          <p:cNvPicPr>
+            <a:picLocks noChangeAspect="1"/>
+          </p:cNvPicPr>
+          <p:nvPr/>
+        </p:nvPicPr>
+        <p:blipFill>
+          <a:blip r:embed="rId5"/>
+          <a:stretch>
+            <a:fillRect/>
+          </a:stretch>
+        </p:blipFill>
+        <p:spPr>
+          <a:xfrm>
+            <a:off x="179714" y="4455527"/>
+            <a:ext cx="6871854" cy="1272566"/>
+          </a:xfrm>
+          <a:prstGeom prst="rect">
+            <a:avLst/>
+          </a:prstGeom>
+        </p:spPr>
+      </p:pic>
+      <p:pic>
+        <p:nvPicPr>
+          <p:cNvPr id="8" name="Immagine 7">
+            <a:extLst>
+              <a:ext uri="{FF2B5EF4-FFF2-40B4-BE49-F238E27FC236}">
+                <a16:creationId xmlns:a16="http://schemas.microsoft.com/office/drawing/2014/main" id="{D780BE4F-3FCD-F5AC-6CA6-B0F1E73CA9D9}"/>
+              </a:ext>
+            </a:extLst>
+          </p:cNvPr>
+          <p:cNvPicPr>
+            <a:picLocks noChangeAspect="1"/>
+          </p:cNvPicPr>
+          <p:nvPr/>
+        </p:nvPicPr>
+        <p:blipFill>
+          <a:blip r:embed="rId6"/>
+          <a:stretch>
+            <a:fillRect/>
+          </a:stretch>
+        </p:blipFill>
+        <p:spPr>
+          <a:xfrm>
+            <a:off x="179715" y="5728093"/>
+            <a:ext cx="6871854" cy="651763"/>
+          </a:xfrm>
+          <a:prstGeom prst="rect">
+            <a:avLst/>
+          </a:prstGeom>
+        </p:spPr>
+      </p:pic>
+      <p:pic>
+        <p:nvPicPr>
+          <p:cNvPr id="13" name="Immagine 12" descr="Immagine che contiene testo, Carattere, bianco, schermata&#10;&#10;Descrizione generata automaticamente">
+            <a:extLst>
+              <a:ext uri="{FF2B5EF4-FFF2-40B4-BE49-F238E27FC236}">
+                <a16:creationId xmlns:a16="http://schemas.microsoft.com/office/drawing/2014/main" id="{E304B690-D863-81E8-1F2C-3FC55AD334CE}"/>
+              </a:ext>
+            </a:extLst>
+          </p:cNvPr>
+          <p:cNvPicPr>
+            <a:picLocks noChangeAspect="1"/>
+          </p:cNvPicPr>
+          <p:nvPr/>
+        </p:nvPicPr>
+        <p:blipFill rotWithShape="1">
+          <a:blip r:embed="rId7"/>
+          <a:srcRect l="67259"/>
+          <a:stretch/>
+        </p:blipFill>
+        <p:spPr>
+          <a:xfrm>
+            <a:off x="2814649" y="1011939"/>
+            <a:ext cx="2581130" cy="1337227"/>
+          </a:xfrm>
+          <a:prstGeom prst="rect">
+            <a:avLst/>
+          </a:prstGeom>
+        </p:spPr>
+      </p:pic>
     </p:spTree>
     <p:extLst>
       <p:ext uri="{BB962C8B-B14F-4D97-AF65-F5344CB8AC3E}">
@@ -10866,7 +10966,7 @@
             <p:ph idx="1"/>
             <p:extLst>
               <p:ext uri="{D42A27DB-BD31-4B8C-83A1-F6EECF244321}">
-                <p14:modId xmlns:p14="http://schemas.microsoft.com/office/powerpoint/2010/main" val="4268776161"/>
+                <p14:modId xmlns:p14="http://schemas.microsoft.com/office/powerpoint/2010/main" val="3655284740"/>
               </p:ext>
             </p:extLst>
           </p:nvPr>
@@ -11110,7 +11210,7 @@
                       <a:pPr algn="ctr"/>
                       <a:r>
                         <a:rPr lang="it-IT" dirty="0"/>
-                        <a:t>8165925</a:t>
+                        <a:t>2313.8</a:t>
                       </a:r>
                     </a:p>
                   </a:txBody>
@@ -11128,7 +11228,7 @@
                       <a:pPr algn="ctr"/>
                       <a:r>
                         <a:rPr lang="it-IT" dirty="0"/>
-                        <a:t>8166235</a:t>
+                        <a:t>2658.2</a:t>
                       </a:r>
                     </a:p>
                   </a:txBody>
@@ -11146,7 +11246,7 @@
                       <a:pPr algn="ctr"/>
                       <a:r>
                         <a:rPr lang="it-IT" dirty="0"/>
-                        <a:t>-4082883</a:t>
+                        <a:t>/</a:t>
                       </a:r>
                     </a:p>
                   </a:txBody>
@@ -11224,8 +11324,8 @@
         </p:nvSpPr>
         <p:spPr>
           <a:xfrm>
-            <a:off x="1627420" y="5649550"/>
-            <a:ext cx="8937154" cy="1208450"/>
+            <a:off x="2239738" y="5610447"/>
+            <a:ext cx="7712523" cy="613776"/>
           </a:xfrm>
           <a:prstGeom prst="rect">
             <a:avLst/>
@@ -11437,42 +11537,28 @@
                 <a:latin typeface="Arial" panose="020B0604020202020204" pitchFamily="34" charset="0"/>
                 <a:cs typeface="Arial" panose="020B0604020202020204" pitchFamily="34" charset="0"/>
               </a:rPr>
-              <a:t>does</a:t>
-            </a:r>
-            <a:r>
-              <a:rPr lang="it-IT" sz="2500" dirty="0">
-                <a:latin typeface="Arial" panose="020B0604020202020204" pitchFamily="34" charset="0"/>
-                <a:cs typeface="Arial" panose="020B0604020202020204" pitchFamily="34" charset="0"/>
-              </a:rPr>
-              <a:t> </a:t>
+              <a:t>could</a:t>
+            </a:r>
+            <a:r>
+              <a:rPr lang="it-IT" sz="2500" dirty="0">
+                <a:latin typeface="Arial" panose="020B0604020202020204" pitchFamily="34" charset="0"/>
+                <a:cs typeface="Arial" panose="020B0604020202020204" pitchFamily="34" charset="0"/>
+              </a:rPr>
+              <a:t> be </a:t>
             </a:r>
             <a:r>
               <a:rPr lang="it-IT" sz="2500" dirty="0" err="1">
                 <a:latin typeface="Arial" panose="020B0604020202020204" pitchFamily="34" charset="0"/>
                 <a:cs typeface="Arial" panose="020B0604020202020204" pitchFamily="34" charset="0"/>
               </a:rPr>
-              <a:t>not</a:t>
-            </a:r>
-            <a:r>
-              <a:rPr lang="it-IT" sz="2500" dirty="0">
-                <a:latin typeface="Arial" panose="020B0604020202020204" pitchFamily="34" charset="0"/>
-                <a:cs typeface="Arial" panose="020B0604020202020204" pitchFamily="34" charset="0"/>
-              </a:rPr>
-              <a:t> </a:t>
-            </a:r>
-            <a:r>
-              <a:rPr lang="it-IT" sz="2500" dirty="0" err="1">
-                <a:latin typeface="Arial" panose="020B0604020202020204" pitchFamily="34" charset="0"/>
-                <a:cs typeface="Arial" panose="020B0604020202020204" pitchFamily="34" charset="0"/>
-              </a:rPr>
-              <a:t>seem</a:t>
-            </a:r>
-            <a:r>
-              <a:rPr lang="it-IT" sz="2500" dirty="0">
-                <a:latin typeface="Arial" panose="020B0604020202020204" pitchFamily="34" charset="0"/>
-                <a:cs typeface="Arial" panose="020B0604020202020204" pitchFamily="34" charset="0"/>
-              </a:rPr>
-              <a:t> so good…</a:t>
+              <a:t>better</a:t>
+            </a:r>
+            <a:r>
+              <a:rPr lang="it-IT" sz="2500" dirty="0">
+                <a:latin typeface="Arial" panose="020B0604020202020204" pitchFamily="34" charset="0"/>
+                <a:cs typeface="Arial" panose="020B0604020202020204" pitchFamily="34" charset="0"/>
+              </a:rPr>
+              <a:t>…</a:t>
             </a:r>
           </a:p>
           <a:p>
@@ -12030,36 +12116,6 @@
           </a:p>
         </p:txBody>
       </p:sp>
-      <p:pic>
-        <p:nvPicPr>
-          <p:cNvPr id="5" name="Immagine 4">
-            <a:extLst>
-              <a:ext uri="{FF2B5EF4-FFF2-40B4-BE49-F238E27FC236}">
-                <a16:creationId xmlns:a16="http://schemas.microsoft.com/office/drawing/2014/main" id="{EB59E78C-B9DE-609E-EE36-E75E9F2803E9}"/>
-              </a:ext>
-            </a:extLst>
-          </p:cNvPr>
-          <p:cNvPicPr>
-            <a:picLocks noChangeAspect="1"/>
-          </p:cNvPicPr>
-          <p:nvPr/>
-        </p:nvPicPr>
-        <p:blipFill>
-          <a:blip r:embed="rId2"/>
-          <a:stretch>
-            <a:fillRect/>
-          </a:stretch>
-        </p:blipFill>
-        <p:spPr>
-          <a:xfrm>
-            <a:off x="316057" y="510528"/>
-            <a:ext cx="5779943" cy="6357938"/>
-          </a:xfrm>
-          <a:prstGeom prst="rect">
-            <a:avLst/>
-          </a:prstGeom>
-        </p:spPr>
-      </p:pic>
       <p:sp>
         <p:nvSpPr>
           <p:cNvPr id="6" name="Freccia giù 5">
@@ -12106,6 +12162,36 @@
           </a:p>
         </p:txBody>
       </p:sp>
+      <p:pic>
+        <p:nvPicPr>
+          <p:cNvPr id="7" name="Immagine 6">
+            <a:extLst>
+              <a:ext uri="{FF2B5EF4-FFF2-40B4-BE49-F238E27FC236}">
+                <a16:creationId xmlns:a16="http://schemas.microsoft.com/office/drawing/2014/main" id="{38217AF2-8B65-D134-7917-2E8AD874428F}"/>
+              </a:ext>
+            </a:extLst>
+          </p:cNvPr>
+          <p:cNvPicPr>
+            <a:picLocks noChangeAspect="1"/>
+          </p:cNvPicPr>
+          <p:nvPr/>
+        </p:nvPicPr>
+        <p:blipFill>
+          <a:blip r:embed="rId2"/>
+          <a:stretch>
+            <a:fillRect/>
+          </a:stretch>
+        </p:blipFill>
+        <p:spPr>
+          <a:xfrm>
+            <a:off x="1" y="581014"/>
+            <a:ext cx="5734494" cy="6307944"/>
+          </a:xfrm>
+          <a:prstGeom prst="rect">
+            <a:avLst/>
+          </a:prstGeom>
+        </p:spPr>
+      </p:pic>
     </p:spTree>
     <p:extLst>
       <p:ext uri="{BB962C8B-B14F-4D97-AF65-F5344CB8AC3E}">
@@ -12297,8 +12383,8 @@
             </p:nvSpPr>
             <p:spPr>
               <a:xfrm>
-                <a:off x="7102549" y="1551042"/>
-                <a:ext cx="4805917" cy="5592725"/>
+                <a:off x="7102549" y="742968"/>
+                <a:ext cx="4805917" cy="6400799"/>
               </a:xfrm>
             </p:spPr>
             <p:txBody>
@@ -12306,6 +12392,53 @@
                 <a:normAutofit/>
               </a:bodyPr>
               <a:lstStyle/>
+              <a:p>
+                <a:pPr marL="0" indent="0" algn="just">
+                  <a:buFont typeface="Arial" panose="020B0604020202020204" pitchFamily="34" charset="0"/>
+                  <a:buNone/>
+                </a:pPr>
+                <a:r>
+                  <a:rPr lang="it-IT" sz="2500" dirty="0" err="1">
+                    <a:latin typeface="Arial" panose="020B0604020202020204" pitchFamily="34" charset="0"/>
+                    <a:cs typeface="Arial" panose="020B0604020202020204" pitchFamily="34" charset="0"/>
+                  </a:rPr>
+                  <a:t>Posterior</a:t>
+                </a:r>
+                <a:r>
+                  <a:rPr lang="it-IT" sz="2500" dirty="0">
+                    <a:latin typeface="Arial" panose="020B0604020202020204" pitchFamily="34" charset="0"/>
+                    <a:cs typeface="Arial" panose="020B0604020202020204" pitchFamily="34" charset="0"/>
+                  </a:rPr>
+                  <a:t> estimate of </a:t>
+                </a:r>
+                <a:r>
+                  <a:rPr lang="it-IT" sz="2500" dirty="0" err="1">
+                    <a:latin typeface="Arial" panose="020B0604020202020204" pitchFamily="34" charset="0"/>
+                    <a:cs typeface="Arial" panose="020B0604020202020204" pitchFamily="34" charset="0"/>
+                  </a:rPr>
+                  <a:t>uvb</a:t>
+                </a:r>
+                <a:r>
+                  <a:rPr lang="it-IT" sz="2500" dirty="0">
+                    <a:latin typeface="Arial" panose="020B0604020202020204" pitchFamily="34" charset="0"/>
+                    <a:cs typeface="Arial" panose="020B0604020202020204" pitchFamily="34" charset="0"/>
+                  </a:rPr>
+                  <a:t> for M1:</a:t>
+                </a:r>
+              </a:p>
+              <a:p>
+                <a:pPr marL="0" indent="0" algn="just">
+                  <a:buFont typeface="Arial" panose="020B0604020202020204" pitchFamily="34" charset="0"/>
+                  <a:buNone/>
+                </a:pPr>
+                <a:r>
+                  <a:rPr lang="it-IT" sz="2500" dirty="0">
+                    <a:latin typeface="Arial" panose="020B0604020202020204" pitchFamily="34" charset="0"/>
+                    <a:cs typeface="Arial" panose="020B0604020202020204" pitchFamily="34" charset="0"/>
+                  </a:rPr>
+                  <a:t>		-0.03443</a:t>
+                </a:r>
+              </a:p>
               <a:p>
                 <a:pPr marL="0" indent="0" algn="just">
                   <a:buNone/>
@@ -12642,13 +12775,13 @@
             </p:nvSpPr>
             <p:spPr>
               <a:xfrm>
-                <a:off x="7102549" y="1551042"/>
-                <a:ext cx="4805917" cy="5592725"/>
+                <a:off x="7102549" y="742968"/>
+                <a:ext cx="4805917" cy="6400799"/>
               </a:xfrm>
               <a:blipFill>
                 <a:blip r:embed="rId3"/>
                 <a:stretch>
-                  <a:fillRect l="-2111" t="-1357" r="-2111"/>
+                  <a:fillRect l="-2111" t="-1386" r="-2111"/>
                 </a:stretch>
               </a:blipFill>
             </p:spPr>
@@ -12669,10 +12802,10 @@
       </mc:AlternateContent>
       <p:pic>
         <p:nvPicPr>
-          <p:cNvPr id="6" name="Immagine 5">
+          <p:cNvPr id="5" name="Immagine 4">
             <a:extLst>
               <a:ext uri="{FF2B5EF4-FFF2-40B4-BE49-F238E27FC236}">
-                <a16:creationId xmlns:a16="http://schemas.microsoft.com/office/drawing/2014/main" id="{8FEDF3A1-644F-42B2-59B9-E629946694E1}"/>
+                <a16:creationId xmlns:a16="http://schemas.microsoft.com/office/drawing/2014/main" id="{C7D011CA-58C2-87CA-EFC3-899ABF907785}"/>
               </a:ext>
             </a:extLst>
           </p:cNvPr>
@@ -12697,239 +12830,6 @@
           </a:prstGeom>
         </p:spPr>
       </p:pic>
-      <p:sp>
-        <p:nvSpPr>
-          <p:cNvPr id="7" name="Segnaposto contenuto 2">
-            <a:extLst>
-              <a:ext uri="{FF2B5EF4-FFF2-40B4-BE49-F238E27FC236}">
-                <a16:creationId xmlns:a16="http://schemas.microsoft.com/office/drawing/2014/main" id="{BC7E9650-4BA6-021B-72E9-0FDFAC7BA510}"/>
-              </a:ext>
-            </a:extLst>
-          </p:cNvPr>
-          <p:cNvSpPr txBox="1">
-            <a:spLocks/>
-          </p:cNvSpPr>
-          <p:nvPr/>
-        </p:nvSpPr>
-        <p:spPr>
-          <a:xfrm>
-            <a:off x="838200" y="904099"/>
-            <a:ext cx="4805917" cy="1399549"/>
-          </a:xfrm>
-          <a:prstGeom prst="rect">
-            <a:avLst/>
-          </a:prstGeom>
-        </p:spPr>
-        <p:txBody>
-          <a:bodyPr vert="horz" lIns="91440" tIns="45720" rIns="91440" bIns="45720" rtlCol="0">
-            <a:normAutofit/>
-          </a:bodyPr>
-          <a:lstStyle>
-            <a:lvl1pPr marL="228600" indent="-228600" algn="l" defTabSz="914400" rtl="0" eaLnBrk="1" latinLnBrk="0" hangingPunct="1">
-              <a:lnSpc>
-                <a:spcPct val="90000"/>
-              </a:lnSpc>
-              <a:spcBef>
-                <a:spcPts val="1000"/>
-              </a:spcBef>
-              <a:buFont typeface="Arial" panose="020B0604020202020204" pitchFamily="34" charset="0"/>
-              <a:buChar char="•"/>
-              <a:defRPr sz="2800" kern="1200">
-                <a:solidFill>
-                  <a:schemeClr val="tx1"/>
-                </a:solidFill>
-                <a:latin typeface="+mn-lt"/>
-                <a:ea typeface="+mn-ea"/>
-                <a:cs typeface="+mn-cs"/>
-              </a:defRPr>
-            </a:lvl1pPr>
-            <a:lvl2pPr marL="685800" indent="-228600" algn="l" defTabSz="914400" rtl="0" eaLnBrk="1" latinLnBrk="0" hangingPunct="1">
-              <a:lnSpc>
-                <a:spcPct val="90000"/>
-              </a:lnSpc>
-              <a:spcBef>
-                <a:spcPts val="500"/>
-              </a:spcBef>
-              <a:buFont typeface="Arial" panose="020B0604020202020204" pitchFamily="34" charset="0"/>
-              <a:buChar char="•"/>
-              <a:defRPr sz="2400" kern="1200">
-                <a:solidFill>
-                  <a:schemeClr val="tx1"/>
-                </a:solidFill>
-                <a:latin typeface="+mn-lt"/>
-                <a:ea typeface="+mn-ea"/>
-                <a:cs typeface="+mn-cs"/>
-              </a:defRPr>
-            </a:lvl2pPr>
-            <a:lvl3pPr marL="1143000" indent="-228600" algn="l" defTabSz="914400" rtl="0" eaLnBrk="1" latinLnBrk="0" hangingPunct="1">
-              <a:lnSpc>
-                <a:spcPct val="90000"/>
-              </a:lnSpc>
-              <a:spcBef>
-                <a:spcPts val="500"/>
-              </a:spcBef>
-              <a:buFont typeface="Arial" panose="020B0604020202020204" pitchFamily="34" charset="0"/>
-              <a:buChar char="•"/>
-              <a:defRPr sz="2000" kern="1200">
-                <a:solidFill>
-                  <a:schemeClr val="tx1"/>
-                </a:solidFill>
-                <a:latin typeface="+mn-lt"/>
-                <a:ea typeface="+mn-ea"/>
-                <a:cs typeface="+mn-cs"/>
-              </a:defRPr>
-            </a:lvl3pPr>
-            <a:lvl4pPr marL="1600200" indent="-228600" algn="l" defTabSz="914400" rtl="0" eaLnBrk="1" latinLnBrk="0" hangingPunct="1">
-              <a:lnSpc>
-                <a:spcPct val="90000"/>
-              </a:lnSpc>
-              <a:spcBef>
-                <a:spcPts val="500"/>
-              </a:spcBef>
-              <a:buFont typeface="Arial" panose="020B0604020202020204" pitchFamily="34" charset="0"/>
-              <a:buChar char="•"/>
-              <a:defRPr sz="1800" kern="1200">
-                <a:solidFill>
-                  <a:schemeClr val="tx1"/>
-                </a:solidFill>
-                <a:latin typeface="+mn-lt"/>
-                <a:ea typeface="+mn-ea"/>
-                <a:cs typeface="+mn-cs"/>
-              </a:defRPr>
-            </a:lvl4pPr>
-            <a:lvl5pPr marL="2057400" indent="-228600" algn="l" defTabSz="914400" rtl="0" eaLnBrk="1" latinLnBrk="0" hangingPunct="1">
-              <a:lnSpc>
-                <a:spcPct val="90000"/>
-              </a:lnSpc>
-              <a:spcBef>
-                <a:spcPts val="500"/>
-              </a:spcBef>
-              <a:buFont typeface="Arial" panose="020B0604020202020204" pitchFamily="34" charset="0"/>
-              <a:buChar char="•"/>
-              <a:defRPr sz="1800" kern="1200">
-                <a:solidFill>
-                  <a:schemeClr val="tx1"/>
-                </a:solidFill>
-                <a:latin typeface="+mn-lt"/>
-                <a:ea typeface="+mn-ea"/>
-                <a:cs typeface="+mn-cs"/>
-              </a:defRPr>
-            </a:lvl5pPr>
-            <a:lvl6pPr marL="2514600" indent="-228600" algn="l" defTabSz="914400" rtl="0" eaLnBrk="1" latinLnBrk="0" hangingPunct="1">
-              <a:lnSpc>
-                <a:spcPct val="90000"/>
-              </a:lnSpc>
-              <a:spcBef>
-                <a:spcPts val="500"/>
-              </a:spcBef>
-              <a:buFont typeface="Arial" panose="020B0604020202020204" pitchFamily="34" charset="0"/>
-              <a:buChar char="•"/>
-              <a:defRPr sz="1800" kern="1200">
-                <a:solidFill>
-                  <a:schemeClr val="tx1"/>
-                </a:solidFill>
-                <a:latin typeface="+mn-lt"/>
-                <a:ea typeface="+mn-ea"/>
-                <a:cs typeface="+mn-cs"/>
-              </a:defRPr>
-            </a:lvl6pPr>
-            <a:lvl7pPr marL="2971800" indent="-228600" algn="l" defTabSz="914400" rtl="0" eaLnBrk="1" latinLnBrk="0" hangingPunct="1">
-              <a:lnSpc>
-                <a:spcPct val="90000"/>
-              </a:lnSpc>
-              <a:spcBef>
-                <a:spcPts val="500"/>
-              </a:spcBef>
-              <a:buFont typeface="Arial" panose="020B0604020202020204" pitchFamily="34" charset="0"/>
-              <a:buChar char="•"/>
-              <a:defRPr sz="1800" kern="1200">
-                <a:solidFill>
-                  <a:schemeClr val="tx1"/>
-                </a:solidFill>
-                <a:latin typeface="+mn-lt"/>
-                <a:ea typeface="+mn-ea"/>
-                <a:cs typeface="+mn-cs"/>
-              </a:defRPr>
-            </a:lvl7pPr>
-            <a:lvl8pPr marL="3429000" indent="-228600" algn="l" defTabSz="914400" rtl="0" eaLnBrk="1" latinLnBrk="0" hangingPunct="1">
-              <a:lnSpc>
-                <a:spcPct val="90000"/>
-              </a:lnSpc>
-              <a:spcBef>
-                <a:spcPts val="500"/>
-              </a:spcBef>
-              <a:buFont typeface="Arial" panose="020B0604020202020204" pitchFamily="34" charset="0"/>
-              <a:buChar char="•"/>
-              <a:defRPr sz="1800" kern="1200">
-                <a:solidFill>
-                  <a:schemeClr val="tx1"/>
-                </a:solidFill>
-                <a:latin typeface="+mn-lt"/>
-                <a:ea typeface="+mn-ea"/>
-                <a:cs typeface="+mn-cs"/>
-              </a:defRPr>
-            </a:lvl8pPr>
-            <a:lvl9pPr marL="3886200" indent="-228600" algn="l" defTabSz="914400" rtl="0" eaLnBrk="1" latinLnBrk="0" hangingPunct="1">
-              <a:lnSpc>
-                <a:spcPct val="90000"/>
-              </a:lnSpc>
-              <a:spcBef>
-                <a:spcPts val="500"/>
-              </a:spcBef>
-              <a:buFont typeface="Arial" panose="020B0604020202020204" pitchFamily="34" charset="0"/>
-              <a:buChar char="•"/>
-              <a:defRPr sz="1800" kern="1200">
-                <a:solidFill>
-                  <a:schemeClr val="tx1"/>
-                </a:solidFill>
-                <a:latin typeface="+mn-lt"/>
-                <a:ea typeface="+mn-ea"/>
-                <a:cs typeface="+mn-cs"/>
-              </a:defRPr>
-            </a:lvl9pPr>
-          </a:lstStyle>
-          <a:p>
-            <a:pPr marL="0" indent="0" algn="just">
-              <a:buFont typeface="Arial" panose="020B0604020202020204" pitchFamily="34" charset="0"/>
-              <a:buNone/>
-            </a:pPr>
-            <a:r>
-              <a:rPr lang="it-IT" sz="2500" dirty="0">
-                <a:latin typeface="Arial" panose="020B0604020202020204" pitchFamily="34" charset="0"/>
-                <a:cs typeface="Arial" panose="020B0604020202020204" pitchFamily="34" charset="0"/>
-              </a:rPr>
-              <a:t>Posterior estimate of </a:t>
-            </a:r>
-            <a:r>
-              <a:rPr lang="it-IT" sz="2500" dirty="0" err="1">
-                <a:latin typeface="Arial" panose="020B0604020202020204" pitchFamily="34" charset="0"/>
-                <a:cs typeface="Arial" panose="020B0604020202020204" pitchFamily="34" charset="0"/>
-              </a:rPr>
-              <a:t>uvb</a:t>
-            </a:r>
-            <a:r>
-              <a:rPr lang="it-IT" sz="2500" dirty="0">
-                <a:latin typeface="Arial" panose="020B0604020202020204" pitchFamily="34" charset="0"/>
-                <a:cs typeface="Arial" panose="020B0604020202020204" pitchFamily="34" charset="0"/>
-              </a:rPr>
-              <a:t> for M1:</a:t>
-            </a:r>
-          </a:p>
-          <a:p>
-            <a:pPr marL="0" indent="0" algn="just">
-              <a:buFont typeface="Arial" panose="020B0604020202020204" pitchFamily="34" charset="0"/>
-              <a:buNone/>
-            </a:pPr>
-            <a:r>
-              <a:rPr lang="it-IT" sz="2500" dirty="0">
-                <a:latin typeface="Arial" panose="020B0604020202020204" pitchFamily="34" charset="0"/>
-                <a:cs typeface="Arial" panose="020B0604020202020204" pitchFamily="34" charset="0"/>
-              </a:rPr>
-              <a:t>		-0.03443</a:t>
-            </a:r>
-          </a:p>
-        </p:txBody>
-      </p:sp>
     </p:spTree>
     <p:extLst>
       <p:ext uri="{BB962C8B-B14F-4D97-AF65-F5344CB8AC3E}">
@@ -13101,8 +13001,8 @@
           </a:p>
         </p:txBody>
       </p:sp>
-      <mc:AlternateContent xmlns:mc="http://schemas.openxmlformats.org/markup-compatibility/2006">
-        <mc:Choice xmlns:a14="http://schemas.microsoft.com/office/drawing/2010/main" Requires="a14">
+      <mc:AlternateContent xmlns:mc="http://schemas.openxmlformats.org/markup-compatibility/2006" xmlns:a14="http://schemas.microsoft.com/office/drawing/2010/main">
+        <mc:Choice Requires="a14">
           <p:sp>
             <p:nvSpPr>
               <p:cNvPr id="10" name="Segnaposto contenuto 2">
@@ -13278,7 +13178,7 @@
             </p:txBody>
           </p:sp>
         </mc:Choice>
-        <mc:Fallback>
+        <mc:Fallback xmlns="">
           <p:sp>
             <p:nvSpPr>
               <p:cNvPr id="10" name="Segnaposto contenuto 2">
@@ -13324,10 +13224,10 @@
       </mc:AlternateContent>
       <p:pic>
         <p:nvPicPr>
-          <p:cNvPr id="9" name="Immagine 8">
+          <p:cNvPr id="5" name="Immagine 4">
             <a:extLst>
               <a:ext uri="{FF2B5EF4-FFF2-40B4-BE49-F238E27FC236}">
-                <a16:creationId xmlns:a16="http://schemas.microsoft.com/office/drawing/2014/main" id="{8277A7B7-036A-E8CA-FE57-77D462DBEC43}"/>
+                <a16:creationId xmlns:a16="http://schemas.microsoft.com/office/drawing/2014/main" id="{41FB24EA-2F15-28CB-B54B-E7D57FB34293}"/>
               </a:ext>
             </a:extLst>
           </p:cNvPr>
@@ -13344,8 +13244,8 @@
         </p:blipFill>
         <p:spPr>
           <a:xfrm>
-            <a:off x="2209800" y="1757756"/>
-            <a:ext cx="7772400" cy="4946072"/>
+            <a:off x="2054688" y="1714513"/>
+            <a:ext cx="8082624" cy="5143487"/>
           </a:xfrm>
           <a:prstGeom prst="rect">
             <a:avLst/>
@@ -13531,8 +13431,8 @@
           <a:chExt cx="0" cy="0"/>
         </a:xfrm>
       </p:grpSpPr>
-      <mc:AlternateContent xmlns:mc="http://schemas.openxmlformats.org/markup-compatibility/2006">
-        <mc:Choice xmlns:a14="http://schemas.microsoft.com/office/drawing/2010/main" Requires="a14">
+      <mc:AlternateContent xmlns:mc="http://schemas.openxmlformats.org/markup-compatibility/2006" xmlns:a14="http://schemas.microsoft.com/office/drawing/2010/main">
+        <mc:Choice Requires="a14">
           <p:sp>
             <p:nvSpPr>
               <p:cNvPr id="10" name="Segnaposto contenuto 2">
@@ -14330,7 +14230,7 @@
             </p:txBody>
           </p:sp>
         </mc:Choice>
-        <mc:Fallback>
+        <mc:Fallback xmlns="">
           <p:sp>
             <p:nvSpPr>
               <p:cNvPr id="10" name="Segnaposto contenuto 2">
@@ -14523,8 +14423,8 @@
           </a:p>
         </p:txBody>
       </p:sp>
-      <mc:AlternateContent xmlns:mc="http://schemas.openxmlformats.org/markup-compatibility/2006">
-        <mc:Choice xmlns:a14="http://schemas.microsoft.com/office/drawing/2010/main" Requires="a14">
+      <mc:AlternateContent xmlns:mc="http://schemas.openxmlformats.org/markup-compatibility/2006" xmlns:a14="http://schemas.microsoft.com/office/drawing/2010/main">
+        <mc:Choice Requires="a14">
           <p:sp>
             <p:nvSpPr>
               <p:cNvPr id="11" name="Segnaposto contenuto 2">
@@ -15095,7 +14995,7 @@
             </p:txBody>
           </p:sp>
         </mc:Choice>
-        <mc:Fallback>
+        <mc:Fallback xmlns="">
           <p:sp>
             <p:nvSpPr>
               <p:cNvPr id="11" name="Segnaposto contenuto 2">
@@ -15540,202 +15440,245 @@
               <a:buNone/>
             </a:pPr>
             <a:r>
-              <a:rPr lang="it-IT" sz="2500" dirty="0">
-                <a:latin typeface="Arial" panose="020B0604020202020204" pitchFamily="34" charset="0"/>
-                <a:cs typeface="Arial" panose="020B0604020202020204" pitchFamily="34" charset="0"/>
-              </a:rPr>
-              <a:t>Model A of the paper </a:t>
-            </a:r>
-            <a:r>
               <a:rPr lang="it-IT" sz="2500" dirty="0" err="1">
                 <a:latin typeface="Arial" panose="020B0604020202020204" pitchFamily="34" charset="0"/>
                 <a:cs typeface="Arial" panose="020B0604020202020204" pitchFamily="34" charset="0"/>
               </a:rPr>
-              <a:t>is</a:t>
-            </a:r>
-            <a:r>
-              <a:rPr lang="it-IT" sz="2500" dirty="0">
-                <a:latin typeface="Arial" panose="020B0604020202020204" pitchFamily="34" charset="0"/>
-                <a:cs typeface="Arial" panose="020B0604020202020204" pitchFamily="34" charset="0"/>
-              </a:rPr>
-              <a:t> a </a:t>
+              <a:t>aic_A</a:t>
+            </a:r>
+            <a:r>
+              <a:rPr lang="it-IT" sz="2500" dirty="0">
+                <a:latin typeface="Arial" panose="020B0604020202020204" pitchFamily="34" charset="0"/>
+                <a:cs typeface="Arial" panose="020B0604020202020204" pitchFamily="34" charset="0"/>
+              </a:rPr>
+              <a:t> &lt;- - 2 * </a:t>
             </a:r>
             <a:r>
               <a:rPr lang="it-IT" sz="2500" dirty="0" err="1">
                 <a:latin typeface="Arial" panose="020B0604020202020204" pitchFamily="34" charset="0"/>
                 <a:cs typeface="Arial" panose="020B0604020202020204" pitchFamily="34" charset="0"/>
               </a:rPr>
-              <a:t>v</a:t>
+              <a:t>elpd_loo_A</a:t>
+            </a:r>
+            <a:r>
+              <a:rPr lang="it-IT" sz="2500" dirty="0">
+                <a:latin typeface="Arial" panose="020B0604020202020204" pitchFamily="34" charset="0"/>
+                <a:cs typeface="Arial" panose="020B0604020202020204" pitchFamily="34" charset="0"/>
+              </a:rPr>
+              <a:t> + 2 * </a:t>
             </a:r>
             <a:r>
               <a:rPr lang="it-IT" sz="2500" dirty="0" err="1">
-                <a:effectLst/>
-                <a:latin typeface="Arial" panose="020B0604020202020204" pitchFamily="34" charset="0"/>
-                <a:cs typeface="Arial" panose="020B0604020202020204" pitchFamily="34" charset="0"/>
-              </a:rPr>
-              <a:t>ariance</a:t>
-            </a:r>
-            <a:r>
-              <a:rPr lang="it-IT" sz="2500" dirty="0">
-                <a:effectLst/>
-                <a:latin typeface="Arial" panose="020B0604020202020204" pitchFamily="34" charset="0"/>
-                <a:cs typeface="Arial" panose="020B0604020202020204" pitchFamily="34" charset="0"/>
-              </a:rPr>
-              <a:t> </a:t>
+                <a:latin typeface="Arial" panose="020B0604020202020204" pitchFamily="34" charset="0"/>
+                <a:cs typeface="Arial" panose="020B0604020202020204" pitchFamily="34" charset="0"/>
+              </a:rPr>
+              <a:t>p</a:t>
+            </a:r>
+            <a:endParaRPr lang="it-IT" sz="2500" dirty="0">
+              <a:latin typeface="Arial" panose="020B0604020202020204" pitchFamily="34" charset="0"/>
+              <a:cs typeface="Arial" panose="020B0604020202020204" pitchFamily="34" charset="0"/>
+            </a:endParaRPr>
+          </a:p>
+          <a:p>
+            <a:pPr marL="0" indent="0" algn="just">
+              <a:buNone/>
+            </a:pPr>
+            <a:r>
+              <a:rPr lang="it-IT" sz="2500" dirty="0">
+                <a:latin typeface="Arial" panose="020B0604020202020204" pitchFamily="34" charset="0"/>
+                <a:cs typeface="Arial" panose="020B0604020202020204" pitchFamily="34" charset="0"/>
+              </a:rPr>
+              <a:t>&gt; </a:t>
             </a:r>
             <a:r>
               <a:rPr lang="it-IT" sz="2500" dirty="0" err="1">
-                <a:effectLst/>
-                <a:latin typeface="Arial" panose="020B0604020202020204" pitchFamily="34" charset="0"/>
-                <a:cs typeface="Arial" panose="020B0604020202020204" pitchFamily="34" charset="0"/>
-              </a:rPr>
-              <a:t>components</a:t>
-            </a:r>
-            <a:r>
-              <a:rPr lang="it-IT" sz="2500" dirty="0">
-                <a:effectLst/>
-                <a:latin typeface="Arial" panose="020B0604020202020204" pitchFamily="34" charset="0"/>
-                <a:cs typeface="Arial" panose="020B0604020202020204" pitchFamily="34" charset="0"/>
-              </a:rPr>
-              <a:t> model with UVBI in the </a:t>
+                <a:latin typeface="Arial" panose="020B0604020202020204" pitchFamily="34" charset="0"/>
+                <a:cs typeface="Arial" panose="020B0604020202020204" pitchFamily="34" charset="0"/>
+              </a:rPr>
+              <a:t>print</a:t>
+            </a:r>
+            <a:r>
+              <a:rPr lang="it-IT" sz="2500" dirty="0">
+                <a:latin typeface="Arial" panose="020B0604020202020204" pitchFamily="34" charset="0"/>
+                <a:cs typeface="Arial" panose="020B0604020202020204" pitchFamily="34" charset="0"/>
+              </a:rPr>
+              <a:t>(</a:t>
             </a:r>
             <a:r>
               <a:rPr lang="it-IT" sz="2500" dirty="0" err="1">
-                <a:effectLst/>
-                <a:latin typeface="Arial" panose="020B0604020202020204" pitchFamily="34" charset="0"/>
-                <a:cs typeface="Arial" panose="020B0604020202020204" pitchFamily="34" charset="0"/>
-              </a:rPr>
-              <a:t>fixed</a:t>
-            </a:r>
-            <a:r>
-              <a:rPr lang="it-IT" sz="2500" dirty="0">
-                <a:effectLst/>
-                <a:latin typeface="Arial" panose="020B0604020202020204" pitchFamily="34" charset="0"/>
-                <a:cs typeface="Arial" panose="020B0604020202020204" pitchFamily="34" charset="0"/>
-              </a:rPr>
-              <a:t> part of the model so </a:t>
+                <a:latin typeface="Arial" panose="020B0604020202020204" pitchFamily="34" charset="0"/>
+                <a:cs typeface="Arial" panose="020B0604020202020204" pitchFamily="34" charset="0"/>
+              </a:rPr>
+              <a:t>aic_A</a:t>
+            </a:r>
+            <a:r>
+              <a:rPr lang="it-IT" sz="2500" dirty="0">
+                <a:latin typeface="Arial" panose="020B0604020202020204" pitchFamily="34" charset="0"/>
+                <a:cs typeface="Arial" panose="020B0604020202020204" pitchFamily="34" charset="0"/>
+              </a:rPr>
+              <a:t>)</a:t>
+            </a:r>
+          </a:p>
+          <a:p>
+            <a:pPr marL="0" indent="0" algn="just">
+              <a:buNone/>
+            </a:pPr>
+            <a:r>
+              <a:rPr lang="it-IT" sz="2500" dirty="0">
+                <a:latin typeface="Arial" panose="020B0604020202020204" pitchFamily="34" charset="0"/>
+                <a:cs typeface="Arial" panose="020B0604020202020204" pitchFamily="34" charset="0"/>
+              </a:rPr>
+              <a:t>[1] 2994.942</a:t>
+            </a:r>
+          </a:p>
+          <a:p>
+            <a:pPr marL="0" indent="0" algn="just">
+              <a:buNone/>
+            </a:pPr>
+            <a:r>
+              <a:rPr lang="it-IT" sz="2500" dirty="0">
+                <a:latin typeface="Arial" panose="020B0604020202020204" pitchFamily="34" charset="0"/>
+                <a:cs typeface="Arial" panose="020B0604020202020204" pitchFamily="34" charset="0"/>
+              </a:rPr>
+              <a:t>&gt; </a:t>
             </a:r>
             <a:r>
               <a:rPr lang="it-IT" sz="2500" dirty="0" err="1">
-                <a:effectLst/>
-                <a:latin typeface="Arial" panose="020B0604020202020204" pitchFamily="34" charset="0"/>
-                <a:cs typeface="Arial" panose="020B0604020202020204" pitchFamily="34" charset="0"/>
-              </a:rPr>
-              <a:t>that</a:t>
-            </a:r>
-            <a:r>
-              <a:rPr lang="it-IT" sz="2500" dirty="0">
-                <a:effectLst/>
-                <a:latin typeface="Arial" panose="020B0604020202020204" pitchFamily="34" charset="0"/>
-                <a:cs typeface="Arial" panose="020B0604020202020204" pitchFamily="34" charset="0"/>
-              </a:rPr>
-              <a:t>, for the </a:t>
-            </a:r>
-            <a:r>
-              <a:rPr lang="it-IT" sz="2500" i="1" dirty="0" err="1">
-                <a:latin typeface="Arial" panose="020B0604020202020204" pitchFamily="34" charset="0"/>
-                <a:cs typeface="Arial" panose="020B0604020202020204" pitchFamily="34" charset="0"/>
-              </a:rPr>
-              <a:t>i</a:t>
+                <a:latin typeface="Arial" panose="020B0604020202020204" pitchFamily="34" charset="0"/>
+                <a:cs typeface="Arial" panose="020B0604020202020204" pitchFamily="34" charset="0"/>
+              </a:rPr>
+              <a:t>bic_A</a:t>
+            </a:r>
+            <a:r>
+              <a:rPr lang="it-IT" sz="2500" dirty="0">
+                <a:latin typeface="Arial" panose="020B0604020202020204" pitchFamily="34" charset="0"/>
+                <a:cs typeface="Arial" panose="020B0604020202020204" pitchFamily="34" charset="0"/>
+              </a:rPr>
+              <a:t> &lt;- - 2 * </a:t>
             </a:r>
             <a:r>
               <a:rPr lang="it-IT" sz="2500" dirty="0" err="1">
                 <a:latin typeface="Arial" panose="020B0604020202020204" pitchFamily="34" charset="0"/>
                 <a:cs typeface="Arial" panose="020B0604020202020204" pitchFamily="34" charset="0"/>
               </a:rPr>
-              <a:t>th</a:t>
-            </a:r>
-            <a:r>
-              <a:rPr lang="it-IT" sz="2500" dirty="0">
-                <a:latin typeface="Arial" panose="020B0604020202020204" pitchFamily="34" charset="0"/>
-                <a:cs typeface="Arial" panose="020B0604020202020204" pitchFamily="34" charset="0"/>
-              </a:rPr>
-              <a:t> </a:t>
+              <a:t>elpd_loo_A</a:t>
+            </a:r>
+            <a:r>
+              <a:rPr lang="it-IT" sz="2500" dirty="0">
+                <a:latin typeface="Arial" panose="020B0604020202020204" pitchFamily="34" charset="0"/>
+                <a:cs typeface="Arial" panose="020B0604020202020204" pitchFamily="34" charset="0"/>
+              </a:rPr>
+              <a:t> + log(</a:t>
             </a:r>
             <a:r>
               <a:rPr lang="it-IT" sz="2500" dirty="0" err="1">
                 <a:latin typeface="Arial" panose="020B0604020202020204" pitchFamily="34" charset="0"/>
                 <a:cs typeface="Arial" panose="020B0604020202020204" pitchFamily="34" charset="0"/>
               </a:rPr>
-              <a:t>county</a:t>
-            </a:r>
-            <a:r>
-              <a:rPr lang="it-IT" sz="2500" dirty="0">
-                <a:latin typeface="Arial" panose="020B0604020202020204" pitchFamily="34" charset="0"/>
-                <a:cs typeface="Arial" panose="020B0604020202020204" pitchFamily="34" charset="0"/>
-              </a:rPr>
-              <a:t> in the </a:t>
-            </a:r>
-            <a:r>
-              <a:rPr lang="it-IT" sz="2500" i="1" dirty="0" err="1">
-                <a:latin typeface="Arial" panose="020B0604020202020204" pitchFamily="34" charset="0"/>
-                <a:cs typeface="Arial" panose="020B0604020202020204" pitchFamily="34" charset="0"/>
-              </a:rPr>
-              <a:t>j</a:t>
+              <a:t>n</a:t>
+            </a:r>
+            <a:r>
+              <a:rPr lang="it-IT" sz="2500" dirty="0">
+                <a:latin typeface="Arial" panose="020B0604020202020204" pitchFamily="34" charset="0"/>
+                <a:cs typeface="Arial" panose="020B0604020202020204" pitchFamily="34" charset="0"/>
+              </a:rPr>
+              <a:t>) * </a:t>
             </a:r>
             <a:r>
               <a:rPr lang="it-IT" sz="2500" dirty="0" err="1">
                 <a:latin typeface="Arial" panose="020B0604020202020204" pitchFamily="34" charset="0"/>
                 <a:cs typeface="Arial" panose="020B0604020202020204" pitchFamily="34" charset="0"/>
               </a:rPr>
-              <a:t>th</a:t>
-            </a:r>
-            <a:r>
-              <a:rPr lang="it-IT" sz="2500" dirty="0">
-                <a:latin typeface="Arial" panose="020B0604020202020204" pitchFamily="34" charset="0"/>
-                <a:cs typeface="Arial" panose="020B0604020202020204" pitchFamily="34" charset="0"/>
-              </a:rPr>
-              <a:t> </a:t>
+              <a:t>p</a:t>
+            </a:r>
+            <a:endParaRPr lang="it-IT" sz="2500" dirty="0">
+              <a:latin typeface="Arial" panose="020B0604020202020204" pitchFamily="34" charset="0"/>
+              <a:cs typeface="Arial" panose="020B0604020202020204" pitchFamily="34" charset="0"/>
+            </a:endParaRPr>
+          </a:p>
+          <a:p>
+            <a:pPr marL="0" indent="0" algn="just">
+              <a:buNone/>
+            </a:pPr>
+            <a:r>
+              <a:rPr lang="it-IT" sz="2500" dirty="0">
+                <a:latin typeface="Arial" panose="020B0604020202020204" pitchFamily="34" charset="0"/>
+                <a:cs typeface="Arial" panose="020B0604020202020204" pitchFamily="34" charset="0"/>
+              </a:rPr>
+              <a:t>&gt; </a:t>
             </a:r>
             <a:r>
               <a:rPr lang="it-IT" sz="2500" dirty="0" err="1">
                 <a:latin typeface="Arial" panose="020B0604020202020204" pitchFamily="34" charset="0"/>
                 <a:cs typeface="Arial" panose="020B0604020202020204" pitchFamily="34" charset="0"/>
               </a:rPr>
-              <a:t>region</a:t>
-            </a:r>
-            <a:r>
-              <a:rPr lang="it-IT" sz="2500" dirty="0">
-                <a:latin typeface="Arial" panose="020B0604020202020204" pitchFamily="34" charset="0"/>
-                <a:cs typeface="Arial" panose="020B0604020202020204" pitchFamily="34" charset="0"/>
-              </a:rPr>
-              <a:t> in the </a:t>
-            </a:r>
-            <a:r>
-              <a:rPr lang="it-IT" sz="2500" i="1" dirty="0" err="1">
-                <a:latin typeface="Arial" panose="020B0604020202020204" pitchFamily="34" charset="0"/>
-                <a:cs typeface="Arial" panose="020B0604020202020204" pitchFamily="34" charset="0"/>
-              </a:rPr>
-              <a:t>k</a:t>
+              <a:t>print</a:t>
+            </a:r>
+            <a:r>
+              <a:rPr lang="it-IT" sz="2500" dirty="0">
+                <a:latin typeface="Arial" panose="020B0604020202020204" pitchFamily="34" charset="0"/>
+                <a:cs typeface="Arial" panose="020B0604020202020204" pitchFamily="34" charset="0"/>
+              </a:rPr>
+              <a:t>(</a:t>
             </a:r>
             <a:r>
               <a:rPr lang="it-IT" sz="2500" dirty="0" err="1">
                 <a:latin typeface="Arial" panose="020B0604020202020204" pitchFamily="34" charset="0"/>
                 <a:cs typeface="Arial" panose="020B0604020202020204" pitchFamily="34" charset="0"/>
               </a:rPr>
-              <a:t>th</a:t>
-            </a:r>
-            <a:r>
-              <a:rPr lang="it-IT" sz="2500" dirty="0">
-                <a:latin typeface="Arial" panose="020B0604020202020204" pitchFamily="34" charset="0"/>
-                <a:cs typeface="Arial" panose="020B0604020202020204" pitchFamily="34" charset="0"/>
-              </a:rPr>
-              <a:t> </a:t>
-            </a:r>
+              <a:t>bic_A</a:t>
+            </a:r>
+            <a:r>
+              <a:rPr lang="it-IT" sz="2500" dirty="0">
+                <a:latin typeface="Arial" panose="020B0604020202020204" pitchFamily="34" charset="0"/>
+                <a:cs typeface="Arial" panose="020B0604020202020204" pitchFamily="34" charset="0"/>
+              </a:rPr>
+              <a:t>)</a:t>
+            </a:r>
+          </a:p>
+          <a:p>
+            <a:pPr marL="0" indent="0" algn="just">
+              <a:buNone/>
+            </a:pPr>
+            <a:r>
+              <a:rPr lang="it-IT" sz="2500" dirty="0">
+                <a:latin typeface="Arial" panose="020B0604020202020204" pitchFamily="34" charset="0"/>
+                <a:cs typeface="Arial" panose="020B0604020202020204" pitchFamily="34" charset="0"/>
+              </a:rPr>
+              <a:t>[1] 4720.648</a:t>
+            </a:r>
+          </a:p>
+          <a:p>
+            <a:pPr marL="0" indent="0" algn="just">
+              <a:buNone/>
+            </a:pPr>
+            <a:endParaRPr lang="it-IT" sz="2500" dirty="0">
+              <a:latin typeface="Arial" panose="020B0604020202020204" pitchFamily="34" charset="0"/>
+              <a:cs typeface="Arial" panose="020B0604020202020204" pitchFamily="34" charset="0"/>
+            </a:endParaRPr>
+          </a:p>
+          <a:p>
+            <a:pPr marL="0" indent="0" algn="just">
+              <a:buNone/>
+            </a:pPr>
             <a:r>
               <a:rPr lang="it-IT" sz="2500" dirty="0" err="1">
                 <a:latin typeface="Arial" panose="020B0604020202020204" pitchFamily="34" charset="0"/>
                 <a:cs typeface="Arial" panose="020B0604020202020204" pitchFamily="34" charset="0"/>
               </a:rPr>
-              <a:t>nation</a:t>
-            </a:r>
-            <a:r>
-              <a:rPr lang="it-IT" sz="2500" dirty="0">
-                <a:latin typeface="Arial" panose="020B0604020202020204" pitchFamily="34" charset="0"/>
-                <a:cs typeface="Arial" panose="020B0604020202020204" pitchFamily="34" charset="0"/>
-              </a:rPr>
-              <a:t>:</a:t>
-            </a:r>
+              <a:t>Èe</a:t>
+            </a:r>
+            <a:r>
+              <a:rPr lang="it-IT" sz="2500">
+                <a:latin typeface="Arial" panose="020B0604020202020204" pitchFamily="34" charset="0"/>
+                <a:cs typeface="Arial" panose="020B0604020202020204" pitchFamily="34" charset="0"/>
+              </a:rPr>
+              <a:t> peggiorato</a:t>
+            </a:r>
+            <a:endParaRPr lang="it-IT" sz="2500" dirty="0">
+              <a:latin typeface="Arial" panose="020B0604020202020204" pitchFamily="34" charset="0"/>
+              <a:cs typeface="Arial" panose="020B0604020202020204" pitchFamily="34" charset="0"/>
+            </a:endParaRPr>
           </a:p>
         </p:txBody>
       </p:sp>
@@ -18021,8 +17964,8 @@
           <a:chExt cx="0" cy="0"/>
         </a:xfrm>
       </p:grpSpPr>
-      <mc:AlternateContent xmlns:mc="http://schemas.openxmlformats.org/markup-compatibility/2006">
-        <mc:Choice xmlns:a14="http://schemas.microsoft.com/office/drawing/2010/main" Requires="a14">
+      <mc:AlternateContent xmlns:mc="http://schemas.openxmlformats.org/markup-compatibility/2006" xmlns:a14="http://schemas.microsoft.com/office/drawing/2010/main">
+        <mc:Choice Requires="a14">
           <p:sp>
             <p:nvSpPr>
               <p:cNvPr id="10" name="Segnaposto contenuto 2">
@@ -18892,7 +18835,7 @@
             </p:txBody>
           </p:sp>
         </mc:Choice>
-        <mc:Fallback>
+        <mc:Fallback xmlns="">
           <p:sp>
             <p:nvSpPr>
               <p:cNvPr id="10" name="Segnaposto contenuto 2">

</xml_diff>

<commit_message>
Updated credible interval and random effect
</commit_message>
<xml_diff>
--- a/UVB-exposure-on-melanoma-mortality.pptx
+++ b/UVB-exposure-on-melanoma-mortality.pptx
@@ -221,7 +221,7 @@
           <a:p>
             <a:fld id="{64772BF1-E5F6-7A49-B9EA-C03B53BF8D93}" type="datetimeFigureOut">
               <a:rPr lang="it-IT" smtClean="0"/>
-              <a:t>12/06/25</a:t>
+              <a:t>14/06/25</a:t>
             </a:fld>
             <a:endParaRPr lang="it-IT"/>
           </a:p>
@@ -1373,6 +1373,76 @@
                 <a:latin typeface="Arial" panose="020B0604020202020204" pitchFamily="34" charset="0"/>
                 <a:cs typeface="Arial" panose="020B0604020202020204" pitchFamily="34" charset="0"/>
               </a:rPr>
+              <a:t> </a:t>
+            </a:r>
+            <a:r>
+              <a:rPr lang="it-IT" sz="1200" dirty="0" err="1">
+                <a:latin typeface="Arial" panose="020B0604020202020204" pitchFamily="34" charset="0"/>
+                <a:cs typeface="Arial" panose="020B0604020202020204" pitchFamily="34" charset="0"/>
+              </a:rPr>
+              <a:t>w.r.t</a:t>
+            </a:r>
+            <a:r>
+              <a:rPr lang="it-IT" sz="1200" dirty="0">
+                <a:latin typeface="Arial" panose="020B0604020202020204" pitchFamily="34" charset="0"/>
+                <a:cs typeface="Arial" panose="020B0604020202020204" pitchFamily="34" charset="0"/>
+              </a:rPr>
+              <a:t>. the global </a:t>
+            </a:r>
+            <a:r>
+              <a:rPr lang="it-IT" sz="1200" dirty="0" err="1">
+                <a:latin typeface="Arial" panose="020B0604020202020204" pitchFamily="34" charset="0"/>
+                <a:cs typeface="Arial" panose="020B0604020202020204" pitchFamily="34" charset="0"/>
+              </a:rPr>
+              <a:t>mean</a:t>
+            </a:r>
+            <a:r>
+              <a:rPr lang="it-IT" sz="1200" dirty="0">
+                <a:latin typeface="Arial" panose="020B0604020202020204" pitchFamily="34" charset="0"/>
+                <a:cs typeface="Arial" panose="020B0604020202020204" pitchFamily="34" charset="0"/>
+              </a:rPr>
+              <a:t> -&gt; more </a:t>
+            </a:r>
+            <a:r>
+              <a:rPr lang="it-IT" sz="1200" dirty="0" err="1">
+                <a:latin typeface="Arial" panose="020B0604020202020204" pitchFamily="34" charset="0"/>
+                <a:cs typeface="Arial" panose="020B0604020202020204" pitchFamily="34" charset="0"/>
+              </a:rPr>
+              <a:t>deaths</a:t>
+            </a:r>
+            <a:r>
+              <a:rPr lang="it-IT" sz="1200" dirty="0">
+                <a:latin typeface="Arial" panose="020B0604020202020204" pitchFamily="34" charset="0"/>
+                <a:cs typeface="Arial" panose="020B0604020202020204" pitchFamily="34" charset="0"/>
+              </a:rPr>
+              <a:t> </a:t>
+            </a:r>
+            <a:r>
+              <a:rPr lang="it-IT" sz="1200" dirty="0" err="1">
+                <a:latin typeface="Arial" panose="020B0604020202020204" pitchFamily="34" charset="0"/>
+                <a:cs typeface="Arial" panose="020B0604020202020204" pitchFamily="34" charset="0"/>
+              </a:rPr>
+              <a:t>than</a:t>
+            </a:r>
+            <a:r>
+              <a:rPr lang="it-IT" sz="1200" dirty="0">
+                <a:latin typeface="Arial" panose="020B0604020202020204" pitchFamily="34" charset="0"/>
+                <a:cs typeface="Arial" panose="020B0604020202020204" pitchFamily="34" charset="0"/>
+              </a:rPr>
+              <a:t> </a:t>
+            </a:r>
+            <a:r>
+              <a:rPr lang="it-IT" sz="1200" dirty="0" err="1">
+                <a:latin typeface="Arial" panose="020B0604020202020204" pitchFamily="34" charset="0"/>
+                <a:cs typeface="Arial" panose="020B0604020202020204" pitchFamily="34" charset="0"/>
+              </a:rPr>
+              <a:t>expected</a:t>
+            </a:r>
+            <a:r>
+              <a:rPr lang="it-IT" sz="1200" dirty="0">
+                <a:latin typeface="Arial" panose="020B0604020202020204" pitchFamily="34" charset="0"/>
+                <a:cs typeface="Arial" panose="020B0604020202020204" pitchFamily="34" charset="0"/>
+              </a:rPr>
               <a:t>.</a:t>
             </a:r>
           </a:p>
@@ -1422,7 +1492,80 @@
               </a:rPr>
               <a:t>intercepts</a:t>
             </a:r>
-            <a:endParaRPr lang="it-IT" dirty="0"/>
+            <a:r>
+              <a:rPr lang="it-IT" sz="1200" dirty="0">
+                <a:latin typeface="Arial" panose="020B0604020202020204" pitchFamily="34" charset="0"/>
+                <a:cs typeface="Arial" panose="020B0604020202020204" pitchFamily="34" charset="0"/>
+              </a:rPr>
+              <a:t> (</a:t>
+            </a:r>
+            <a:r>
+              <a:rPr lang="it-IT" sz="1200" dirty="0" err="1">
+                <a:latin typeface="Arial" panose="020B0604020202020204" pitchFamily="34" charset="0"/>
+                <a:cs typeface="Arial" panose="020B0604020202020204" pitchFamily="34" charset="0"/>
+              </a:rPr>
+              <a:t>uncertainty</a:t>
+            </a:r>
+            <a:r>
+              <a:rPr lang="it-IT" sz="1200" dirty="0">
+                <a:latin typeface="Arial" panose="020B0604020202020204" pitchFamily="34" charset="0"/>
+                <a:cs typeface="Arial" panose="020B0604020202020204" pitchFamily="34" charset="0"/>
+              </a:rPr>
+              <a:t>) -&gt; the </a:t>
+            </a:r>
+            <a:r>
+              <a:rPr lang="it-IT" sz="1200" dirty="0" err="1">
+                <a:latin typeface="Arial" panose="020B0604020202020204" pitchFamily="34" charset="0"/>
+                <a:cs typeface="Arial" panose="020B0604020202020204" pitchFamily="34" charset="0"/>
+              </a:rPr>
+              <a:t>longer</a:t>
+            </a:r>
+            <a:r>
+              <a:rPr lang="it-IT" sz="1200" dirty="0">
+                <a:latin typeface="Arial" panose="020B0604020202020204" pitchFamily="34" charset="0"/>
+                <a:cs typeface="Arial" panose="020B0604020202020204" pitchFamily="34" charset="0"/>
+              </a:rPr>
+              <a:t>, the </a:t>
+            </a:r>
+            <a:r>
+              <a:rPr lang="it-IT" sz="1200" dirty="0" err="1">
+                <a:latin typeface="Arial" panose="020B0604020202020204" pitchFamily="34" charset="0"/>
+                <a:cs typeface="Arial" panose="020B0604020202020204" pitchFamily="34" charset="0"/>
+              </a:rPr>
+              <a:t>less</a:t>
+            </a:r>
+            <a:r>
+              <a:rPr lang="it-IT" sz="1200" dirty="0">
+                <a:latin typeface="Arial" panose="020B0604020202020204" pitchFamily="34" charset="0"/>
+                <a:cs typeface="Arial" panose="020B0604020202020204" pitchFamily="34" charset="0"/>
+              </a:rPr>
+              <a:t> info or data for </a:t>
+            </a:r>
+            <a:r>
+              <a:rPr lang="it-IT" sz="1200" dirty="0" err="1">
+                <a:latin typeface="Arial" panose="020B0604020202020204" pitchFamily="34" charset="0"/>
+                <a:cs typeface="Arial" panose="020B0604020202020204" pitchFamily="34" charset="0"/>
+              </a:rPr>
+              <a:t>that</a:t>
+            </a:r>
+            <a:r>
+              <a:rPr lang="it-IT" sz="1200" dirty="0">
+                <a:latin typeface="Arial" panose="020B0604020202020204" pitchFamily="34" charset="0"/>
+                <a:cs typeface="Arial" panose="020B0604020202020204" pitchFamily="34" charset="0"/>
+              </a:rPr>
+              <a:t> </a:t>
+            </a:r>
+            <a:r>
+              <a:rPr lang="it-IT" sz="1200" dirty="0" err="1">
+                <a:latin typeface="Arial" panose="020B0604020202020204" pitchFamily="34" charset="0"/>
+                <a:cs typeface="Arial" panose="020B0604020202020204" pitchFamily="34" charset="0"/>
+              </a:rPr>
+              <a:t>region</a:t>
+            </a:r>
+            <a:endParaRPr lang="it-IT" sz="1200" dirty="0">
+              <a:latin typeface="Arial" panose="020B0604020202020204" pitchFamily="34" charset="0"/>
+              <a:cs typeface="Arial" panose="020B0604020202020204" pitchFamily="34" charset="0"/>
+            </a:endParaRPr>
           </a:p>
         </p:txBody>
       </p:sp>
@@ -1760,6 +1903,341 @@
         <p:txBody>
           <a:bodyPr/>
           <a:lstStyle/>
+          <a:p>
+            <a:pPr>
+              <a:buNone/>
+            </a:pPr>
+            <a:r>
+              <a:rPr lang="it-IT" dirty="0">
+                <a:solidFill>
+                  <a:srgbClr val="1B2A2D"/>
+                </a:solidFill>
+                <a:effectLst/>
+                <a:latin typeface="Helvetica" pitchFamily="2" charset="0"/>
+              </a:rPr>
+              <a:t>In </a:t>
+            </a:r>
+            <a:r>
+              <a:rPr lang="it-IT" dirty="0" err="1">
+                <a:solidFill>
+                  <a:srgbClr val="1B2A2D"/>
+                </a:solidFill>
+                <a:effectLst/>
+                <a:latin typeface="Helvetica" pitchFamily="2" charset="0"/>
+              </a:rPr>
+              <a:t>comparing</a:t>
+            </a:r>
+            <a:r>
+              <a:rPr lang="it-IT" dirty="0">
+                <a:solidFill>
+                  <a:srgbClr val="1B2A2D"/>
+                </a:solidFill>
+                <a:effectLst/>
+                <a:latin typeface="Helvetica" pitchFamily="2" charset="0"/>
+              </a:rPr>
+              <a:t> </a:t>
+            </a:r>
+            <a:r>
+              <a:rPr lang="it-IT" dirty="0" err="1">
+                <a:solidFill>
+                  <a:srgbClr val="C23525"/>
+                </a:solidFill>
+                <a:effectLst/>
+                <a:latin typeface="Helvetica" pitchFamily="2" charset="0"/>
+              </a:rPr>
+              <a:t>nested</a:t>
+            </a:r>
+            <a:r>
+              <a:rPr lang="it-IT" dirty="0">
+                <a:solidFill>
+                  <a:srgbClr val="C23525"/>
+                </a:solidFill>
+                <a:effectLst/>
+                <a:latin typeface="Helvetica" pitchFamily="2" charset="0"/>
+              </a:rPr>
+              <a:t> </a:t>
+            </a:r>
+            <a:r>
+              <a:rPr lang="it-IT" dirty="0">
+                <a:solidFill>
+                  <a:srgbClr val="1B2A2D"/>
+                </a:solidFill>
+                <a:effectLst/>
+                <a:latin typeface="Helvetica" pitchFamily="2" charset="0"/>
+              </a:rPr>
+              <a:t>models, the key </a:t>
+            </a:r>
+            <a:r>
+              <a:rPr lang="it-IT" dirty="0" err="1">
+                <a:solidFill>
+                  <a:srgbClr val="1B2A2D"/>
+                </a:solidFill>
+                <a:effectLst/>
+                <a:latin typeface="Helvetica" pitchFamily="2" charset="0"/>
+              </a:rPr>
+              <a:t>questions</a:t>
+            </a:r>
+            <a:r>
+              <a:rPr lang="it-IT" dirty="0">
+                <a:solidFill>
+                  <a:srgbClr val="1B2A2D"/>
+                </a:solidFill>
+                <a:effectLst/>
+                <a:latin typeface="Helvetica" pitchFamily="2" charset="0"/>
+              </a:rPr>
+              <a:t> of model </a:t>
+            </a:r>
+            <a:r>
+              <a:rPr lang="it-IT" dirty="0" err="1">
+                <a:solidFill>
+                  <a:srgbClr val="1B2A2D"/>
+                </a:solidFill>
+                <a:effectLst/>
+                <a:latin typeface="Helvetica" pitchFamily="2" charset="0"/>
+              </a:rPr>
+              <a:t>comparison</a:t>
+            </a:r>
+            <a:r>
+              <a:rPr lang="it-IT">
+                <a:solidFill>
+                  <a:srgbClr val="1B2A2D"/>
+                </a:solidFill>
+                <a:effectLst/>
+                <a:latin typeface="Helvetica" pitchFamily="2" charset="0"/>
+              </a:rPr>
+              <a:t> are typically</a:t>
+            </a:r>
+            <a:r>
+              <a:rPr lang="it-IT" dirty="0">
+                <a:solidFill>
+                  <a:srgbClr val="1B2A2D"/>
+                </a:solidFill>
+                <a:effectLst/>
+                <a:latin typeface="Helvetica" pitchFamily="2" charset="0"/>
+              </a:rPr>
+              <a:t>: (1) </a:t>
+            </a:r>
+            <a:r>
+              <a:rPr lang="it-IT" dirty="0" err="1">
+                <a:solidFill>
+                  <a:srgbClr val="1B2A2D"/>
+                </a:solidFill>
+                <a:effectLst/>
+                <a:latin typeface="Helvetica" pitchFamily="2" charset="0"/>
+              </a:rPr>
+              <a:t>is</a:t>
+            </a:r>
+            <a:r>
+              <a:rPr lang="it-IT" dirty="0">
+                <a:solidFill>
+                  <a:srgbClr val="1B2A2D"/>
+                </a:solidFill>
+                <a:effectLst/>
+                <a:latin typeface="Helvetica" pitchFamily="2" charset="0"/>
+              </a:rPr>
+              <a:t> the </a:t>
+            </a:r>
+            <a:r>
+              <a:rPr lang="it-IT" dirty="0" err="1">
+                <a:solidFill>
+                  <a:srgbClr val="1B2A2D"/>
+                </a:solidFill>
+                <a:effectLst/>
+                <a:latin typeface="Helvetica" pitchFamily="2" charset="0"/>
+              </a:rPr>
+              <a:t>improvement</a:t>
+            </a:r>
+            <a:r>
+              <a:rPr lang="it-IT" dirty="0">
+                <a:solidFill>
+                  <a:srgbClr val="1B2A2D"/>
+                </a:solidFill>
+                <a:effectLst/>
+                <a:latin typeface="Helvetica" pitchFamily="2" charset="0"/>
+              </a:rPr>
+              <a:t> in fit large </a:t>
+            </a:r>
+            <a:r>
+              <a:rPr lang="it-IT" dirty="0" err="1">
+                <a:solidFill>
+                  <a:srgbClr val="1B2A2D"/>
+                </a:solidFill>
+                <a:effectLst/>
+                <a:latin typeface="Helvetica" pitchFamily="2" charset="0"/>
+              </a:rPr>
+              <a:t>enough</a:t>
+            </a:r>
+            <a:r>
+              <a:rPr lang="it-IT" dirty="0">
+                <a:solidFill>
+                  <a:srgbClr val="1B2A2D"/>
+                </a:solidFill>
+                <a:effectLst/>
+                <a:latin typeface="Helvetica" pitchFamily="2" charset="0"/>
+              </a:rPr>
+              <a:t> to </a:t>
+            </a:r>
+            <a:r>
+              <a:rPr lang="it-IT" dirty="0" err="1">
+                <a:solidFill>
+                  <a:srgbClr val="1B2A2D"/>
+                </a:solidFill>
+                <a:effectLst/>
+                <a:latin typeface="Helvetica" pitchFamily="2" charset="0"/>
+              </a:rPr>
+              <a:t>justify</a:t>
+            </a:r>
+            <a:r>
+              <a:rPr lang="it-IT" dirty="0">
+                <a:solidFill>
+                  <a:srgbClr val="1B2A2D"/>
+                </a:solidFill>
+                <a:effectLst/>
+                <a:latin typeface="Helvetica" pitchFamily="2" charset="0"/>
+              </a:rPr>
+              <a:t> the </a:t>
+            </a:r>
+            <a:r>
+              <a:rPr lang="it-IT" dirty="0" err="1">
+                <a:solidFill>
+                  <a:srgbClr val="1B2A2D"/>
+                </a:solidFill>
+                <a:effectLst/>
+                <a:latin typeface="Helvetica" pitchFamily="2" charset="0"/>
+              </a:rPr>
+              <a:t>additional</a:t>
+            </a:r>
+            <a:r>
+              <a:rPr lang="it-IT" dirty="0">
+                <a:solidFill>
+                  <a:srgbClr val="1B2A2D"/>
+                </a:solidFill>
+                <a:effectLst/>
+                <a:latin typeface="Helvetica" pitchFamily="2" charset="0"/>
+              </a:rPr>
+              <a:t> </a:t>
+            </a:r>
+            <a:r>
+              <a:rPr lang="it-IT" dirty="0" err="1">
+                <a:solidFill>
+                  <a:srgbClr val="1B2A2D"/>
+                </a:solidFill>
+                <a:effectLst/>
+                <a:latin typeface="Helvetica" pitchFamily="2" charset="0"/>
+              </a:rPr>
+              <a:t>diﬃculty</a:t>
+            </a:r>
+            <a:r>
+              <a:rPr lang="it-IT" dirty="0">
+                <a:solidFill>
+                  <a:srgbClr val="1B2A2D"/>
+                </a:solidFill>
+                <a:effectLst/>
+                <a:latin typeface="Helvetica" pitchFamily="2" charset="0"/>
+              </a:rPr>
+              <a:t> in fitting, and (2) </a:t>
+            </a:r>
+            <a:r>
+              <a:rPr lang="it-IT" dirty="0" err="1">
+                <a:solidFill>
+                  <a:srgbClr val="1B2A2D"/>
+                </a:solidFill>
+                <a:effectLst/>
+                <a:latin typeface="Helvetica" pitchFamily="2" charset="0"/>
+              </a:rPr>
+              <a:t>is</a:t>
+            </a:r>
+            <a:r>
+              <a:rPr lang="it-IT" dirty="0">
+                <a:solidFill>
+                  <a:srgbClr val="1B2A2D"/>
+                </a:solidFill>
+                <a:effectLst/>
+                <a:latin typeface="Helvetica" pitchFamily="2" charset="0"/>
+              </a:rPr>
+              <a:t> the </a:t>
+            </a:r>
+            <a:r>
+              <a:rPr lang="it-IT" dirty="0" err="1">
+                <a:solidFill>
+                  <a:srgbClr val="1B2A2D"/>
+                </a:solidFill>
+                <a:effectLst/>
+                <a:latin typeface="Helvetica" pitchFamily="2" charset="0"/>
+              </a:rPr>
+              <a:t>prior</a:t>
+            </a:r>
+            <a:r>
+              <a:rPr lang="it-IT" dirty="0">
+                <a:solidFill>
+                  <a:srgbClr val="1B2A2D"/>
+                </a:solidFill>
+                <a:effectLst/>
+                <a:latin typeface="Helvetica" pitchFamily="2" charset="0"/>
+              </a:rPr>
+              <a:t> </a:t>
+            </a:r>
+            <a:r>
+              <a:rPr lang="it-IT" dirty="0" err="1">
+                <a:solidFill>
+                  <a:srgbClr val="1B2A2D"/>
+                </a:solidFill>
+                <a:effectLst/>
+                <a:latin typeface="Helvetica" pitchFamily="2" charset="0"/>
+              </a:rPr>
+              <a:t>distribution</a:t>
+            </a:r>
+            <a:r>
+              <a:rPr lang="it-IT" dirty="0">
+                <a:solidFill>
+                  <a:srgbClr val="1B2A2D"/>
+                </a:solidFill>
+                <a:effectLst/>
+                <a:latin typeface="Helvetica" pitchFamily="2" charset="0"/>
+              </a:rPr>
+              <a:t> on the </a:t>
+            </a:r>
+            <a:r>
+              <a:rPr lang="it-IT" dirty="0" err="1">
+                <a:solidFill>
+                  <a:srgbClr val="1B2A2D"/>
+                </a:solidFill>
+                <a:effectLst/>
+                <a:latin typeface="Helvetica" pitchFamily="2" charset="0"/>
+              </a:rPr>
+              <a:t>additional</a:t>
+            </a:r>
+            <a:r>
+              <a:rPr lang="it-IT" dirty="0">
+                <a:solidFill>
+                  <a:srgbClr val="1B2A2D"/>
+                </a:solidFill>
+                <a:effectLst/>
+                <a:latin typeface="Helvetica" pitchFamily="2" charset="0"/>
+              </a:rPr>
+              <a:t> parameters </a:t>
+            </a:r>
+            <a:r>
+              <a:rPr lang="it-IT" dirty="0" err="1">
+                <a:solidFill>
+                  <a:srgbClr val="1B2A2D"/>
+                </a:solidFill>
+                <a:effectLst/>
+                <a:latin typeface="Helvetica" pitchFamily="2" charset="0"/>
+              </a:rPr>
+              <a:t>reasonable</a:t>
+            </a:r>
+            <a:r>
+              <a:rPr lang="it-IT" dirty="0">
+                <a:solidFill>
+                  <a:srgbClr val="1B2A2D"/>
+                </a:solidFill>
+                <a:effectLst/>
+                <a:latin typeface="Helvetica" pitchFamily="2" charset="0"/>
+              </a:rPr>
+              <a:t>?</a:t>
+            </a:r>
+          </a:p>
           <a:p>
             <a:endParaRPr lang="it-IT" dirty="0"/>
           </a:p>
@@ -2406,10 +2884,9 @@
               <a:t>nations</a:t>
             </a:r>
             <a:r>
-              <a:rPr lang="it-IT"/>
+              <a:rPr lang="it-IT" dirty="0"/>
               <a:t>.</a:t>
             </a:r>
-            <a:endParaRPr lang="it-IT" dirty="0"/>
           </a:p>
         </p:txBody>
       </p:sp>
@@ -3680,7 +4157,7 @@
             </a:r>
             <a:r>
               <a:rPr lang="it-IT" dirty="0" err="1"/>
-              <a:t>freedon</a:t>
+              <a:t>freedom</a:t>
             </a:r>
             <a:r>
               <a:rPr lang="it-IT" dirty="0"/>
@@ -3996,7 +4473,7 @@
           <a:p>
             <a:fld id="{4EA50560-6CC8-914C-9AB5-2FD017C5E165}" type="datetimeFigureOut">
               <a:rPr lang="it-IT" smtClean="0"/>
-              <a:t>12/06/25</a:t>
+              <a:t>14/06/25</a:t>
             </a:fld>
             <a:endParaRPr lang="it-IT"/>
           </a:p>
@@ -4194,7 +4671,7 @@
           <a:p>
             <a:fld id="{4EA50560-6CC8-914C-9AB5-2FD017C5E165}" type="datetimeFigureOut">
               <a:rPr lang="it-IT" smtClean="0"/>
-              <a:t>12/06/25</a:t>
+              <a:t>14/06/25</a:t>
             </a:fld>
             <a:endParaRPr lang="it-IT"/>
           </a:p>
@@ -4402,7 +4879,7 @@
           <a:p>
             <a:fld id="{4EA50560-6CC8-914C-9AB5-2FD017C5E165}" type="datetimeFigureOut">
               <a:rPr lang="it-IT" smtClean="0"/>
-              <a:t>12/06/25</a:t>
+              <a:t>14/06/25</a:t>
             </a:fld>
             <a:endParaRPr lang="it-IT"/>
           </a:p>
@@ -4600,7 +5077,7 @@
           <a:p>
             <a:fld id="{4EA50560-6CC8-914C-9AB5-2FD017C5E165}" type="datetimeFigureOut">
               <a:rPr lang="it-IT" smtClean="0"/>
-              <a:t>12/06/25</a:t>
+              <a:t>14/06/25</a:t>
             </a:fld>
             <a:endParaRPr lang="it-IT"/>
           </a:p>
@@ -4875,7 +5352,7 @@
           <a:p>
             <a:fld id="{4EA50560-6CC8-914C-9AB5-2FD017C5E165}" type="datetimeFigureOut">
               <a:rPr lang="it-IT" smtClean="0"/>
-              <a:t>12/06/25</a:t>
+              <a:t>14/06/25</a:t>
             </a:fld>
             <a:endParaRPr lang="it-IT"/>
           </a:p>
@@ -5140,7 +5617,7 @@
           <a:p>
             <a:fld id="{4EA50560-6CC8-914C-9AB5-2FD017C5E165}" type="datetimeFigureOut">
               <a:rPr lang="it-IT" smtClean="0"/>
-              <a:t>12/06/25</a:t>
+              <a:t>14/06/25</a:t>
             </a:fld>
             <a:endParaRPr lang="it-IT"/>
           </a:p>
@@ -5552,7 +6029,7 @@
           <a:p>
             <a:fld id="{4EA50560-6CC8-914C-9AB5-2FD017C5E165}" type="datetimeFigureOut">
               <a:rPr lang="it-IT" smtClean="0"/>
-              <a:t>12/06/25</a:t>
+              <a:t>14/06/25</a:t>
             </a:fld>
             <a:endParaRPr lang="it-IT"/>
           </a:p>
@@ -5693,7 +6170,7 @@
           <a:p>
             <a:fld id="{4EA50560-6CC8-914C-9AB5-2FD017C5E165}" type="datetimeFigureOut">
               <a:rPr lang="it-IT" smtClean="0"/>
-              <a:t>12/06/25</a:t>
+              <a:t>14/06/25</a:t>
             </a:fld>
             <a:endParaRPr lang="it-IT"/>
           </a:p>
@@ -5806,7 +6283,7 @@
           <a:p>
             <a:fld id="{4EA50560-6CC8-914C-9AB5-2FD017C5E165}" type="datetimeFigureOut">
               <a:rPr lang="it-IT" smtClean="0"/>
-              <a:t>12/06/25</a:t>
+              <a:t>14/06/25</a:t>
             </a:fld>
             <a:endParaRPr lang="it-IT"/>
           </a:p>
@@ -6117,7 +6594,7 @@
           <a:p>
             <a:fld id="{4EA50560-6CC8-914C-9AB5-2FD017C5E165}" type="datetimeFigureOut">
               <a:rPr lang="it-IT" smtClean="0"/>
-              <a:t>12/06/25</a:t>
+              <a:t>14/06/25</a:t>
             </a:fld>
             <a:endParaRPr lang="it-IT"/>
           </a:p>
@@ -6405,7 +6882,7 @@
           <a:p>
             <a:fld id="{4EA50560-6CC8-914C-9AB5-2FD017C5E165}" type="datetimeFigureOut">
               <a:rPr lang="it-IT" smtClean="0"/>
-              <a:t>12/06/25</a:t>
+              <a:t>14/06/25</a:t>
             </a:fld>
             <a:endParaRPr lang="it-IT"/>
           </a:p>
@@ -6646,7 +7123,7 @@
           <a:p>
             <a:fld id="{4EA50560-6CC8-914C-9AB5-2FD017C5E165}" type="datetimeFigureOut">
               <a:rPr lang="it-IT" smtClean="0"/>
-              <a:t>12/06/25</a:t>
+              <a:t>14/06/25</a:t>
             </a:fld>
             <a:endParaRPr lang="it-IT"/>
           </a:p>
@@ -15803,10 +16280,10 @@
       </mc:AlternateContent>
       <p:pic>
         <p:nvPicPr>
-          <p:cNvPr id="5" name="Immagine 4">
+          <p:cNvPr id="8" name="Immagine 7">
             <a:extLst>
               <a:ext uri="{FF2B5EF4-FFF2-40B4-BE49-F238E27FC236}">
-                <a16:creationId xmlns:a16="http://schemas.microsoft.com/office/drawing/2014/main" id="{41FB24EA-2F15-28CB-B54B-E7D57FB34293}"/>
+                <a16:creationId xmlns:a16="http://schemas.microsoft.com/office/drawing/2014/main" id="{C17745DA-7915-9AD1-6B64-6D0E3FD38BEC}"/>
               </a:ext>
             </a:extLst>
           </p:cNvPr>
@@ -15817,14 +16294,13 @@
         </p:nvPicPr>
         <p:blipFill>
           <a:blip r:embed="rId4"/>
-          <a:stretch>
-            <a:fillRect/>
-          </a:stretch>
+          <a:srcRect t="4911" b="1980"/>
+          <a:stretch/>
         </p:blipFill>
         <p:spPr>
           <a:xfrm>
-            <a:off x="2054688" y="1714513"/>
-            <a:ext cx="8082624" cy="5143487"/>
+            <a:off x="573427" y="1716067"/>
+            <a:ext cx="11045145" cy="5141933"/>
           </a:xfrm>
           <a:prstGeom prst="rect">
             <a:avLst/>

</xml_diff>